<commit_message>
update OrderCommand Sequence Diagram
</commit_message>
<xml_diff>
--- a/docs/diagrams/OrderSequenceDiagram.pptx
+++ b/docs/diagrams/OrderSequenceDiagram.pptx
@@ -3609,7 +3609,7 @@
         </p:nvSpPr>
         <p:spPr>
           <a:xfrm>
-            <a:off x="2361693" y="2209800"/>
+            <a:off x="2361693" y="2402745"/>
             <a:ext cx="152907" cy="2702655"/>
           </a:xfrm>
           <a:prstGeom prst="rect">
@@ -3851,9 +3851,9 @@
           <p:nvPr/>
         </p:nvCxnSpPr>
         <p:spPr>
-          <a:xfrm flipV="1">
-            <a:off x="520568" y="2081218"/>
-            <a:ext cx="1100566" cy="18249"/>
+          <a:xfrm>
+            <a:off x="565099" y="2514600"/>
+            <a:ext cx="1796594" cy="6178"/>
           </a:xfrm>
           <a:prstGeom prst="straightConnector1">
             <a:avLst/>
@@ -3888,7 +3888,7 @@
         </p:nvSpPr>
         <p:spPr>
           <a:xfrm>
-            <a:off x="520569" y="1662998"/>
+            <a:off x="523220" y="2083723"/>
             <a:ext cx="1100566" cy="369332"/>
           </a:xfrm>
           <a:prstGeom prst="rect">
@@ -3908,7 +3908,7 @@
                   <a:srgbClr val="0070C0"/>
                 </a:solidFill>
               </a:rPr>
-              <a:t>OrderCommand (orderParameter)</a:t>
+              <a:t>executeUndoableCommand ()</a:t>
             </a:r>
             <a:endParaRPr lang="en-US" sz="1200" dirty="0">
               <a:solidFill>
@@ -3962,7 +3962,7 @@
         </p:nvCxnSpPr>
         <p:spPr>
           <a:xfrm>
-            <a:off x="990600" y="4800600"/>
+            <a:off x="990600" y="5029200"/>
             <a:ext cx="1371093" cy="0"/>
           </a:xfrm>
           <a:prstGeom prst="straightConnector1">
@@ -4056,7 +4056,7 @@
           <p:cNvPr id="67" name="Straight Arrow Connector 66">
             <a:extLst>
               <a:ext uri="{FF2B5EF4-FFF2-40B4-BE49-F238E27FC236}">
-                <a16:creationId xmlns:a16="http://schemas.microsoft.com/office/drawing/2014/main" xmlns="" id="{D881596E-177C-4FDC-8E60-CAB90B3D5FAB}"/>
+                <a16:creationId xmlns="" xmlns:a16="http://schemas.microsoft.com/office/drawing/2014/main" id="{D881596E-177C-4FDC-8E60-CAB90B3D5FAB}"/>
               </a:ext>
             </a:extLst>
           </p:cNvPr>
@@ -4481,7 +4481,7 @@
         </p:nvSpPr>
         <p:spPr>
           <a:xfrm>
-            <a:off x="1536492" y="4586521"/>
+            <a:off x="1536492" y="4815121"/>
             <a:ext cx="455705" cy="184666"/>
           </a:xfrm>
           <a:prstGeom prst="rect">

</xml_diff>